<commit_message>
add new corpus to the project.
</commit_message>
<xml_diff>
--- a/doc/AI Anti-phishing.pptx
+++ b/doc/AI Anti-phishing.pptx
@@ -214,7 +214,7 @@
           <a:p>
             <a:fld id="{7553DD64-06AD-E64A-8098-BD51A3D5F647}" type="datetimeFigureOut">
               <a:rPr kumimoji="1" lang="zh-CN" altLang="en-US" smtClean="0"/>
-              <a:t>2020/8/28</a:t>
+              <a:t>2020/8/31</a:t>
             </a:fld>
             <a:endParaRPr kumimoji="1" lang="zh-CN" altLang="en-US"/>
           </a:p>
@@ -706,7 +706,7 @@
           <a:p>
             <a:fld id="{AE1A547C-B457-A943-8000-9FA1EC6330E8}" type="datetimeFigureOut">
               <a:rPr kumimoji="1" lang="zh-CN" altLang="en-US" smtClean="0"/>
-              <a:t>2020/8/28</a:t>
+              <a:t>2020/8/31</a:t>
             </a:fld>
             <a:endParaRPr kumimoji="1" lang="zh-CN" altLang="en-US"/>
           </a:p>
@@ -874,7 +874,7 @@
           <a:p>
             <a:fld id="{AE1A547C-B457-A943-8000-9FA1EC6330E8}" type="datetimeFigureOut">
               <a:rPr kumimoji="1" lang="zh-CN" altLang="en-US" smtClean="0"/>
-              <a:t>2020/8/28</a:t>
+              <a:t>2020/8/31</a:t>
             </a:fld>
             <a:endParaRPr kumimoji="1" lang="zh-CN" altLang="en-US"/>
           </a:p>
@@ -1052,7 +1052,7 @@
           <a:p>
             <a:fld id="{AE1A547C-B457-A943-8000-9FA1EC6330E8}" type="datetimeFigureOut">
               <a:rPr kumimoji="1" lang="zh-CN" altLang="en-US" smtClean="0"/>
-              <a:t>2020/8/28</a:t>
+              <a:t>2020/8/31</a:t>
             </a:fld>
             <a:endParaRPr kumimoji="1" lang="zh-CN" altLang="en-US"/>
           </a:p>
@@ -1220,7 +1220,7 @@
           <a:p>
             <a:fld id="{AE1A547C-B457-A943-8000-9FA1EC6330E8}" type="datetimeFigureOut">
               <a:rPr kumimoji="1" lang="zh-CN" altLang="en-US" smtClean="0"/>
-              <a:t>2020/8/28</a:t>
+              <a:t>2020/8/31</a:t>
             </a:fld>
             <a:endParaRPr kumimoji="1" lang="zh-CN" altLang="en-US"/>
           </a:p>
@@ -1465,7 +1465,7 @@
           <a:p>
             <a:fld id="{AE1A547C-B457-A943-8000-9FA1EC6330E8}" type="datetimeFigureOut">
               <a:rPr kumimoji="1" lang="zh-CN" altLang="en-US" smtClean="0"/>
-              <a:t>2020/8/28</a:t>
+              <a:t>2020/8/31</a:t>
             </a:fld>
             <a:endParaRPr kumimoji="1" lang="zh-CN" altLang="en-US"/>
           </a:p>
@@ -1694,7 +1694,7 @@
           <a:p>
             <a:fld id="{AE1A547C-B457-A943-8000-9FA1EC6330E8}" type="datetimeFigureOut">
               <a:rPr kumimoji="1" lang="zh-CN" altLang="en-US" smtClean="0"/>
-              <a:t>2020/8/28</a:t>
+              <a:t>2020/8/31</a:t>
             </a:fld>
             <a:endParaRPr kumimoji="1" lang="zh-CN" altLang="en-US"/>
           </a:p>
@@ -2058,7 +2058,7 @@
           <a:p>
             <a:fld id="{AE1A547C-B457-A943-8000-9FA1EC6330E8}" type="datetimeFigureOut">
               <a:rPr kumimoji="1" lang="zh-CN" altLang="en-US" smtClean="0"/>
-              <a:t>2020/8/28</a:t>
+              <a:t>2020/8/31</a:t>
             </a:fld>
             <a:endParaRPr kumimoji="1" lang="zh-CN" altLang="en-US"/>
           </a:p>
@@ -2175,7 +2175,7 @@
           <a:p>
             <a:fld id="{AE1A547C-B457-A943-8000-9FA1EC6330E8}" type="datetimeFigureOut">
               <a:rPr kumimoji="1" lang="zh-CN" altLang="en-US" smtClean="0"/>
-              <a:t>2020/8/28</a:t>
+              <a:t>2020/8/31</a:t>
             </a:fld>
             <a:endParaRPr kumimoji="1" lang="zh-CN" altLang="en-US"/>
           </a:p>
@@ -2270,7 +2270,7 @@
           <a:p>
             <a:fld id="{AE1A547C-B457-A943-8000-9FA1EC6330E8}" type="datetimeFigureOut">
               <a:rPr kumimoji="1" lang="zh-CN" altLang="en-US" smtClean="0"/>
-              <a:t>2020/8/28</a:t>
+              <a:t>2020/8/31</a:t>
             </a:fld>
             <a:endParaRPr kumimoji="1" lang="zh-CN" altLang="en-US"/>
           </a:p>
@@ -2545,7 +2545,7 @@
           <a:p>
             <a:fld id="{AE1A547C-B457-A943-8000-9FA1EC6330E8}" type="datetimeFigureOut">
               <a:rPr kumimoji="1" lang="zh-CN" altLang="en-US" smtClean="0"/>
-              <a:t>2020/8/28</a:t>
+              <a:t>2020/8/31</a:t>
             </a:fld>
             <a:endParaRPr kumimoji="1" lang="zh-CN" altLang="en-US"/>
           </a:p>
@@ -2797,7 +2797,7 @@
           <a:p>
             <a:fld id="{AE1A547C-B457-A943-8000-9FA1EC6330E8}" type="datetimeFigureOut">
               <a:rPr kumimoji="1" lang="zh-CN" altLang="en-US" smtClean="0"/>
-              <a:t>2020/8/28</a:t>
+              <a:t>2020/8/31</a:t>
             </a:fld>
             <a:endParaRPr kumimoji="1" lang="zh-CN" altLang="en-US"/>
           </a:p>
@@ -3008,7 +3008,7 @@
           <a:p>
             <a:fld id="{AE1A547C-B457-A943-8000-9FA1EC6330E8}" type="datetimeFigureOut">
               <a:rPr kumimoji="1" lang="zh-CN" altLang="en-US" smtClean="0"/>
-              <a:t>2020/8/28</a:t>
+              <a:t>2020/8/31</a:t>
             </a:fld>
             <a:endParaRPr kumimoji="1" lang="zh-CN" altLang="en-US"/>
           </a:p>
@@ -4712,7 +4712,17 @@
               <a:rPr kumimoji="1" lang="en-US" altLang="zh-CN" dirty="0" smtClean="0"/>
               <a:t>Install on server</a:t>
             </a:r>
-            <a:endParaRPr kumimoji="1" lang="en-US" altLang="zh-CN" dirty="0"/>
+          </a:p>
+          <a:p>
+            <a:r>
+              <a:rPr lang="en-US" altLang="zh-CN"/>
+              <a:t>zero-day </a:t>
+            </a:r>
+            <a:r>
+              <a:rPr kumimoji="1" lang="en-US" altLang="zh-CN" smtClean="0"/>
+              <a:t>problem</a:t>
+            </a:r>
+            <a:endParaRPr lang="en-US" altLang="zh-CN"/>
           </a:p>
         </p:txBody>
       </p:sp>
@@ -5034,8 +5044,8 @@
           </a:p>
           <a:p>
             <a:r>
-              <a:rPr kumimoji="1" lang="en-US" altLang="zh-CN" dirty="0" smtClean="0"/>
-              <a:t>Dataset.</a:t>
+              <a:rPr kumimoji="1" lang="en-US" altLang="zh-CN" smtClean="0"/>
+              <a:t>Datasets.</a:t>
             </a:r>
             <a:endParaRPr kumimoji="1" lang="en-US" altLang="zh-CN" dirty="0"/>
           </a:p>
@@ -5215,11 +5225,7 @@
           <a:p>
             <a:r>
               <a:rPr kumimoji="1" lang="en-US" altLang="zh-CN" dirty="0" smtClean="0"/>
-              <a:t>Ph</a:t>
-            </a:r>
-            <a:r>
-              <a:rPr kumimoji="1" lang="en-US" altLang="zh-CN" dirty="0" smtClean="0"/>
-              <a:t>ishing Features</a:t>
+              <a:t>Phishing Features</a:t>
             </a:r>
             <a:endParaRPr kumimoji="1" lang="zh-CN" altLang="en-US" dirty="0"/>
           </a:p>
@@ -5468,7 +5474,6 @@
               <a:rPr kumimoji="1" lang="en-US" altLang="zh-CN" dirty="0" smtClean="0"/>
               <a:t>features</a:t>
             </a:r>
-            <a:endParaRPr kumimoji="1" lang="en-US" altLang="zh-CN" dirty="0" smtClean="0"/>
           </a:p>
           <a:p>
             <a:r>

</xml_diff>